<commit_message>
Use same normalization for fold vs repeat wise accuracy calcs
</commit_message>
<xml_diff>
--- a/plots/Manuscript_Draft/movement_analysis/movement_analysis.pptx
+++ b/plots/Manuscript_Draft/movement_analysis/movement_analysis.pptx
@@ -107,6 +107,11 @@
       </a:defRPr>
     </a:lvl9pPr>
   </p:defaultTextStyle>
+  <p:extLst>
+    <p:ext uri="{EFAFB233-063F-42B5-8137-9DF3F51BA10A}">
+      <p15:sldGuideLst xmlns:p15="http://schemas.microsoft.com/office/powerpoint/2012/main"/>
+    </p:ext>
+  </p:extLst>
 </p:presentation>
 </file>
 
@@ -3860,10 +3865,10 @@
       </p:sp>
       <p:pic>
         <p:nvPicPr>
-          <p:cNvPr id="24" name="Picture 23">
-            <a:extLst>
-              <a:ext uri="{FF2B5EF4-FFF2-40B4-BE49-F238E27FC236}">
-                <a16:creationId xmlns:a16="http://schemas.microsoft.com/office/drawing/2014/main" id="{B7BB5291-8723-4419-3619-1FAF7829DB03}"/>
+          <p:cNvPr id="5" name="Picture 4">
+            <a:extLst>
+              <a:ext uri="{FF2B5EF4-FFF2-40B4-BE49-F238E27FC236}">
+                <a16:creationId xmlns:a16="http://schemas.microsoft.com/office/drawing/2014/main" id="{07DFC155-15F9-D3AD-D723-4CE355919BA3}"/>
               </a:ext>
             </a:extLst>
           </p:cNvPr>
@@ -3879,806 +3884,30 @@
         </p:blipFill>
         <p:spPr>
           <a:xfrm>
-            <a:off x="288088" y="2631152"/>
-            <a:ext cx="2533541" cy="1900156"/>
+            <a:off x="1" y="13610"/>
+            <a:ext cx="4545496" cy="3787914"/>
           </a:xfrm>
           <a:prstGeom prst="rect">
             <a:avLst/>
           </a:prstGeom>
         </p:spPr>
       </p:pic>
-      <p:pic>
-        <p:nvPicPr>
-          <p:cNvPr id="26" name="Picture 25">
-            <a:extLst>
-              <a:ext uri="{FF2B5EF4-FFF2-40B4-BE49-F238E27FC236}">
-                <a16:creationId xmlns:a16="http://schemas.microsoft.com/office/drawing/2014/main" id="{9318A533-137C-FA37-E454-C46CA30F8E7F}"/>
-              </a:ext>
-            </a:extLst>
-          </p:cNvPr>
-          <p:cNvPicPr>
-            <a:picLocks noChangeAspect="1"/>
-          </p:cNvPicPr>
+      <p:sp>
+        <p:nvSpPr>
+          <p:cNvPr id="6" name="TextBox 5">
+            <a:extLst>
+              <a:ext uri="{FF2B5EF4-FFF2-40B4-BE49-F238E27FC236}">
+                <a16:creationId xmlns:a16="http://schemas.microsoft.com/office/drawing/2014/main" id="{18625C00-BD37-0165-7CE7-53250C2409A5}"/>
+              </a:ext>
+            </a:extLst>
+          </p:cNvPr>
+          <p:cNvSpPr txBox="1"/>
           <p:nvPr/>
-        </p:nvPicPr>
-        <p:blipFill>
-          <a:blip r:embed="rId4"/>
-          <a:srcRect/>
-          <a:stretch/>
-        </p:blipFill>
+        </p:nvSpPr>
         <p:spPr>
           <a:xfrm>
-            <a:off x="2821629" y="2631152"/>
-            <a:ext cx="2533541" cy="1900156"/>
-          </a:xfrm>
-          <a:prstGeom prst="rect">
-            <a:avLst/>
-          </a:prstGeom>
-        </p:spPr>
-      </p:pic>
-      <p:graphicFrame>
-        <p:nvGraphicFramePr>
-          <p:cNvPr id="2" name="Table 1">
-            <a:extLst>
-              <a:ext uri="{FF2B5EF4-FFF2-40B4-BE49-F238E27FC236}">
-                <a16:creationId xmlns:a16="http://schemas.microsoft.com/office/drawing/2014/main" id="{A526C854-15DF-FC35-448C-44891A4782F3}"/>
-              </a:ext>
-            </a:extLst>
-          </p:cNvPr>
-          <p:cNvGraphicFramePr>
-            <a:graphicFrameLocks noGrp="1"/>
-          </p:cNvGraphicFramePr>
-          <p:nvPr/>
-        </p:nvGraphicFramePr>
-        <p:xfrm>
-          <a:off x="324198" y="546028"/>
-          <a:ext cx="4204050" cy="1552705"/>
-        </p:xfrm>
-        <a:graphic>
-          <a:graphicData uri="http://schemas.openxmlformats.org/drawingml/2006/table">
-            <a:tbl>
-              <a:tblPr>
-                <a:tableStyleId>{5940675A-B579-460E-94D1-54222C63F5DA}</a:tableStyleId>
-              </a:tblPr>
-              <a:tblGrid>
-                <a:gridCol w="1118352">
-                  <a:extLst>
-                    <a:ext uri="{9D8B030D-6E8A-4147-A177-3AD203B41FA5}">
-                      <a16:colId xmlns:a16="http://schemas.microsoft.com/office/drawing/2014/main" val="4280255978"/>
-                    </a:ext>
-                  </a:extLst>
-                </a:gridCol>
-                <a:gridCol w="1028566">
-                  <a:extLst>
-                    <a:ext uri="{9D8B030D-6E8A-4147-A177-3AD203B41FA5}">
-                      <a16:colId xmlns:a16="http://schemas.microsoft.com/office/drawing/2014/main" val="3232715643"/>
-                    </a:ext>
-                  </a:extLst>
-                </a:gridCol>
-                <a:gridCol w="1028566">
-                  <a:extLst>
-                    <a:ext uri="{9D8B030D-6E8A-4147-A177-3AD203B41FA5}">
-                      <a16:colId xmlns:a16="http://schemas.microsoft.com/office/drawing/2014/main" val="2315446393"/>
-                    </a:ext>
-                  </a:extLst>
-                </a:gridCol>
-                <a:gridCol w="1028566">
-                  <a:extLst>
-                    <a:ext uri="{9D8B030D-6E8A-4147-A177-3AD203B41FA5}">
-                      <a16:colId xmlns:a16="http://schemas.microsoft.com/office/drawing/2014/main" val="1778341717"/>
-                    </a:ext>
-                  </a:extLst>
-                </a:gridCol>
-              </a:tblGrid>
-              <a:tr h="221815">
-                <a:tc>
-                  <a:txBody>
-                    <a:bodyPr/>
-                    <a:lstStyle/>
-                    <a:p>
-                      <a:pPr algn="ctr" fontAlgn="b"/>
-                      <a:endParaRPr lang="en-US" sz="1000" b="0" i="0" u="none" strike="noStrike">
-                        <a:solidFill>
-                          <a:srgbClr val="000000"/>
-                        </a:solidFill>
-                        <a:effectLst/>
-                        <a:latin typeface="Tw Cen MT" panose="020B0602020104020603" pitchFamily="34" charset="77"/>
-                      </a:endParaRPr>
-                    </a:p>
-                  </a:txBody>
-                  <a:tcPr marL="5357" marR="5357" marT="5357" marB="0" anchor="ctr"/>
-                </a:tc>
-                <a:tc>
-                  <a:txBody>
-                    <a:bodyPr/>
-                    <a:lstStyle/>
-                    <a:p>
-                      <a:pPr algn="ctr" fontAlgn="b"/>
-                      <a:r>
-                        <a:rPr lang="en-US" sz="1000" b="1" u="none" strike="noStrike" dirty="0">
-                          <a:effectLst/>
-                          <a:latin typeface="Tw Cen MT" panose="020B0602020104020603" pitchFamily="34" charset="77"/>
-                        </a:rPr>
-                        <a:t>No filter</a:t>
-                      </a:r>
-                      <a:endParaRPr lang="en-US" sz="1000" b="1" i="0" u="none" strike="noStrike" dirty="0">
-                        <a:solidFill>
-                          <a:srgbClr val="000000"/>
-                        </a:solidFill>
-                        <a:effectLst/>
-                        <a:latin typeface="Tw Cen MT" panose="020B0602020104020603" pitchFamily="34" charset="77"/>
-                      </a:endParaRPr>
-                    </a:p>
-                  </a:txBody>
-                  <a:tcPr marL="5357" marR="5357" marT="5357" marB="0" anchor="ctr"/>
-                </a:tc>
-                <a:tc>
-                  <a:txBody>
-                    <a:bodyPr/>
-                    <a:lstStyle/>
-                    <a:p>
-                      <a:pPr algn="ctr" fontAlgn="b"/>
-                      <a:r>
-                        <a:rPr lang="en-US" sz="1000" b="1" i="0" u="none" strike="noStrike" dirty="0">
-                          <a:solidFill>
-                            <a:srgbClr val="000000"/>
-                          </a:solidFill>
-                          <a:effectLst/>
-                          <a:latin typeface="Tw Cen MT" panose="020B0602020104020603" pitchFamily="34" charset="77"/>
-                        </a:rPr>
-                        <a:t>Lenient filter</a:t>
-                      </a:r>
-                    </a:p>
-                  </a:txBody>
-                  <a:tcPr marL="5357" marR="5357" marT="5357" marB="0" anchor="ctr"/>
-                </a:tc>
-                <a:tc>
-                  <a:txBody>
-                    <a:bodyPr/>
-                    <a:lstStyle/>
-                    <a:p>
-                      <a:pPr algn="ctr" fontAlgn="b"/>
-                      <a:r>
-                        <a:rPr lang="en-US" sz="1000" b="1" i="0" u="none" strike="noStrike" dirty="0">
-                          <a:solidFill>
-                            <a:srgbClr val="000000"/>
-                          </a:solidFill>
-                          <a:effectLst/>
-                          <a:latin typeface="Tw Cen MT" panose="020B0602020104020603" pitchFamily="34" charset="77"/>
-                        </a:rPr>
-                        <a:t>Stringent filter</a:t>
-                      </a:r>
-                    </a:p>
-                  </a:txBody>
-                  <a:tcPr marL="5357" marR="5357" marT="5357" marB="0" anchor="ctr"/>
-                </a:tc>
-                <a:extLst>
-                  <a:ext uri="{0D108BD9-81ED-4DB2-BD59-A6C34878D82A}">
-                    <a16:rowId xmlns:a16="http://schemas.microsoft.com/office/drawing/2014/main" val="2778594163"/>
-                  </a:ext>
-                </a:extLst>
-              </a:tr>
-              <a:tr h="221815">
-                <a:tc>
-                  <a:txBody>
-                    <a:bodyPr/>
-                    <a:lstStyle/>
-                    <a:p>
-                      <a:pPr algn="ctr" fontAlgn="b"/>
-                      <a:r>
-                        <a:rPr lang="en-US" sz="1000" u="none" strike="noStrike">
-                          <a:effectLst/>
-                          <a:latin typeface="Tw Cen MT" panose="020B0602020104020603" pitchFamily="34" charset="77"/>
-                        </a:rPr>
-                        <a:t>UCLA Control</a:t>
-                      </a:r>
-                      <a:endParaRPr lang="en-US" sz="1000" b="0" i="0" u="none" strike="noStrike">
-                        <a:solidFill>
-                          <a:srgbClr val="000000"/>
-                        </a:solidFill>
-                        <a:effectLst/>
-                        <a:latin typeface="Tw Cen MT" panose="020B0602020104020603" pitchFamily="34" charset="77"/>
-                      </a:endParaRPr>
-                    </a:p>
-                  </a:txBody>
-                  <a:tcPr marL="5357" marR="5357" marT="5357" marB="0" anchor="ctr"/>
-                </a:tc>
-                <a:tc>
-                  <a:txBody>
-                    <a:bodyPr/>
-                    <a:lstStyle/>
-                    <a:p>
-                      <a:pPr algn="ctr" fontAlgn="b"/>
-                      <a:r>
-                        <a:rPr lang="en-US" sz="1000" u="none" strike="noStrike" dirty="0">
-                          <a:effectLst/>
-                          <a:latin typeface="Tw Cen MT" panose="020B0602020104020603" pitchFamily="34" charset="77"/>
-                        </a:rPr>
-                        <a:t>117*</a:t>
-                      </a:r>
-                      <a:endParaRPr lang="en-US" sz="1000" b="0" i="0" u="none" strike="noStrike" dirty="0">
-                        <a:solidFill>
-                          <a:srgbClr val="000000"/>
-                        </a:solidFill>
-                        <a:effectLst/>
-                        <a:latin typeface="Tw Cen MT" panose="020B0602020104020603" pitchFamily="34" charset="77"/>
-                      </a:endParaRPr>
-                    </a:p>
-                  </a:txBody>
-                  <a:tcPr marL="5357" marR="5357" marT="5357" marB="0" anchor="ctr"/>
-                </a:tc>
-                <a:tc>
-                  <a:txBody>
-                    <a:bodyPr/>
-                    <a:lstStyle/>
-                    <a:p>
-                      <a:pPr algn="ctr" fontAlgn="b"/>
-                      <a:r>
-                        <a:rPr lang="en-US" sz="1000" u="none" strike="noStrike" dirty="0">
-                          <a:effectLst/>
-                          <a:latin typeface="Tw Cen MT" panose="020B0602020104020603" pitchFamily="34" charset="77"/>
-                        </a:rPr>
-                        <a:t>116</a:t>
-                      </a:r>
-                      <a:endParaRPr lang="en-US" sz="1000" b="0" i="0" u="none" strike="noStrike" dirty="0">
-                        <a:solidFill>
-                          <a:srgbClr val="000000"/>
-                        </a:solidFill>
-                        <a:effectLst/>
-                        <a:latin typeface="Tw Cen MT" panose="020B0602020104020603" pitchFamily="34" charset="77"/>
-                      </a:endParaRPr>
-                    </a:p>
-                  </a:txBody>
-                  <a:tcPr marL="5357" marR="5357" marT="5357" marB="0" anchor="ctr"/>
-                </a:tc>
-                <a:tc>
-                  <a:txBody>
-                    <a:bodyPr/>
-                    <a:lstStyle/>
-                    <a:p>
-                      <a:pPr algn="ctr" fontAlgn="b"/>
-                      <a:r>
-                        <a:rPr lang="en-US" sz="1000" u="none" strike="noStrike" dirty="0">
-                          <a:effectLst/>
-                          <a:latin typeface="Tw Cen MT" panose="020B0602020104020603" pitchFamily="34" charset="77"/>
-                        </a:rPr>
-                        <a:t>99</a:t>
-                      </a:r>
-                      <a:endParaRPr lang="en-US" sz="1000" b="0" i="0" u="none" strike="noStrike" dirty="0">
-                        <a:solidFill>
-                          <a:srgbClr val="000000"/>
-                        </a:solidFill>
-                        <a:effectLst/>
-                        <a:latin typeface="Tw Cen MT" panose="020B0602020104020603" pitchFamily="34" charset="77"/>
-                      </a:endParaRPr>
-                    </a:p>
-                  </a:txBody>
-                  <a:tcPr marL="5357" marR="5357" marT="5357" marB="0" anchor="ctr"/>
-                </a:tc>
-                <a:extLst>
-                  <a:ext uri="{0D108BD9-81ED-4DB2-BD59-A6C34878D82A}">
-                    <a16:rowId xmlns:a16="http://schemas.microsoft.com/office/drawing/2014/main" val="258392852"/>
-                  </a:ext>
-                </a:extLst>
-              </a:tr>
-              <a:tr h="221815">
-                <a:tc>
-                  <a:txBody>
-                    <a:bodyPr/>
-                    <a:lstStyle/>
-                    <a:p>
-                      <a:pPr algn="ctr" fontAlgn="b"/>
-                      <a:r>
-                        <a:rPr lang="en-US" sz="1000" u="none" strike="noStrike" dirty="0">
-                          <a:effectLst/>
-                          <a:latin typeface="Tw Cen MT" panose="020B0602020104020603" pitchFamily="34" charset="77"/>
-                        </a:rPr>
-                        <a:t>UCLA Schizophrenia</a:t>
-                      </a:r>
-                      <a:endParaRPr lang="en-US" sz="1000" b="0" i="0" u="none" strike="noStrike" dirty="0">
-                        <a:solidFill>
-                          <a:srgbClr val="000000"/>
-                        </a:solidFill>
-                        <a:effectLst/>
-                        <a:latin typeface="Tw Cen MT" panose="020B0602020104020603" pitchFamily="34" charset="77"/>
-                      </a:endParaRPr>
-                    </a:p>
-                  </a:txBody>
-                  <a:tcPr marL="5357" marR="5357" marT="5357" marB="0" anchor="ctr"/>
-                </a:tc>
-                <a:tc>
-                  <a:txBody>
-                    <a:bodyPr/>
-                    <a:lstStyle/>
-                    <a:p>
-                      <a:pPr algn="ctr" fontAlgn="b"/>
-                      <a:r>
-                        <a:rPr lang="en-US" sz="1000" u="none" strike="noStrike" dirty="0">
-                          <a:effectLst/>
-                          <a:latin typeface="Tw Cen MT" panose="020B0602020104020603" pitchFamily="34" charset="77"/>
-                        </a:rPr>
-                        <a:t>48</a:t>
-                      </a:r>
-                      <a:endParaRPr lang="en-US" sz="1000" b="0" i="0" u="none" strike="noStrike" dirty="0">
-                        <a:solidFill>
-                          <a:srgbClr val="000000"/>
-                        </a:solidFill>
-                        <a:effectLst/>
-                        <a:latin typeface="Tw Cen MT" panose="020B0602020104020603" pitchFamily="34" charset="77"/>
-                      </a:endParaRPr>
-                    </a:p>
-                  </a:txBody>
-                  <a:tcPr marL="5357" marR="5357" marT="5357" marB="0" anchor="ctr"/>
-                </a:tc>
-                <a:tc>
-                  <a:txBody>
-                    <a:bodyPr/>
-                    <a:lstStyle/>
-                    <a:p>
-                      <a:pPr algn="ctr" fontAlgn="b"/>
-                      <a:r>
-                        <a:rPr lang="en-US" sz="1000" u="none" strike="noStrike" dirty="0">
-                          <a:effectLst/>
-                          <a:latin typeface="Tw Cen MT" panose="020B0602020104020603" pitchFamily="34" charset="77"/>
-                        </a:rPr>
-                        <a:t>48</a:t>
-                      </a:r>
-                      <a:endParaRPr lang="en-US" sz="1000" b="0" i="0" u="none" strike="noStrike" dirty="0">
-                        <a:solidFill>
-                          <a:srgbClr val="000000"/>
-                        </a:solidFill>
-                        <a:effectLst/>
-                        <a:latin typeface="Tw Cen MT" panose="020B0602020104020603" pitchFamily="34" charset="77"/>
-                      </a:endParaRPr>
-                    </a:p>
-                  </a:txBody>
-                  <a:tcPr marL="5357" marR="5357" marT="5357" marB="0" anchor="ctr"/>
-                </a:tc>
-                <a:tc>
-                  <a:txBody>
-                    <a:bodyPr/>
-                    <a:lstStyle/>
-                    <a:p>
-                      <a:pPr algn="ctr" fontAlgn="b"/>
-                      <a:r>
-                        <a:rPr lang="en-US" sz="1000" u="none" strike="noStrike" dirty="0">
-                          <a:effectLst/>
-                          <a:latin typeface="Tw Cen MT" panose="020B0602020104020603" pitchFamily="34" charset="77"/>
-                        </a:rPr>
-                        <a:t>21</a:t>
-                      </a:r>
-                      <a:endParaRPr lang="en-US" sz="1000" b="0" i="0" u="none" strike="noStrike" dirty="0">
-                        <a:solidFill>
-                          <a:srgbClr val="000000"/>
-                        </a:solidFill>
-                        <a:effectLst/>
-                        <a:latin typeface="Tw Cen MT" panose="020B0602020104020603" pitchFamily="34" charset="77"/>
-                      </a:endParaRPr>
-                    </a:p>
-                  </a:txBody>
-                  <a:tcPr marL="5357" marR="5357" marT="5357" marB="0" anchor="ctr"/>
-                </a:tc>
-                <a:extLst>
-                  <a:ext uri="{0D108BD9-81ED-4DB2-BD59-A6C34878D82A}">
-                    <a16:rowId xmlns:a16="http://schemas.microsoft.com/office/drawing/2014/main" val="33403047"/>
-                  </a:ext>
-                </a:extLst>
-              </a:tr>
-              <a:tr h="221815">
-                <a:tc>
-                  <a:txBody>
-                    <a:bodyPr/>
-                    <a:lstStyle/>
-                    <a:p>
-                      <a:pPr algn="ctr" fontAlgn="b"/>
-                      <a:r>
-                        <a:rPr lang="en-US" sz="1000" b="0" i="0" u="none" strike="noStrike" dirty="0">
-                          <a:solidFill>
-                            <a:srgbClr val="000000"/>
-                          </a:solidFill>
-                          <a:effectLst/>
-                          <a:latin typeface="Tw Cen MT" panose="020B0602020104020603" pitchFamily="34" charset="77"/>
-                        </a:rPr>
-                        <a:t>UCLA Bipolar</a:t>
-                      </a:r>
-                    </a:p>
-                  </a:txBody>
-                  <a:tcPr marL="5357" marR="5357" marT="5357" marB="0" anchor="ctr"/>
-                </a:tc>
-                <a:tc>
-                  <a:txBody>
-                    <a:bodyPr/>
-                    <a:lstStyle/>
-                    <a:p>
-                      <a:pPr algn="ctr" fontAlgn="b"/>
-                      <a:r>
-                        <a:rPr lang="en-US" sz="1000" b="0" i="0" u="none" strike="noStrike" dirty="0">
-                          <a:solidFill>
-                            <a:srgbClr val="000000"/>
-                          </a:solidFill>
-                          <a:effectLst/>
-                          <a:latin typeface="Tw Cen MT" panose="020B0602020104020603" pitchFamily="34" charset="77"/>
-                        </a:rPr>
-                        <a:t>49</a:t>
-                      </a:r>
-                    </a:p>
-                  </a:txBody>
-                  <a:tcPr marL="5357" marR="5357" marT="5357" marB="0" anchor="ctr"/>
-                </a:tc>
-                <a:tc>
-                  <a:txBody>
-                    <a:bodyPr/>
-                    <a:lstStyle/>
-                    <a:p>
-                      <a:pPr algn="ctr" fontAlgn="b"/>
-                      <a:r>
-                        <a:rPr lang="en-US" sz="1000" b="0" i="0" u="none" strike="noStrike" dirty="0">
-                          <a:solidFill>
-                            <a:srgbClr val="000000"/>
-                          </a:solidFill>
-                          <a:effectLst/>
-                          <a:latin typeface="Tw Cen MT" panose="020B0602020104020603" pitchFamily="34" charset="77"/>
-                        </a:rPr>
-                        <a:t>49</a:t>
-                      </a:r>
-                    </a:p>
-                  </a:txBody>
-                  <a:tcPr marL="5357" marR="5357" marT="5357" marB="0" anchor="ctr">
-                    <a:noFill/>
-                  </a:tcPr>
-                </a:tc>
-                <a:tc>
-                  <a:txBody>
-                    <a:bodyPr/>
-                    <a:lstStyle/>
-                    <a:p>
-                      <a:pPr algn="ctr" fontAlgn="b"/>
-                      <a:r>
-                        <a:rPr lang="en-US" sz="1000" b="0" i="0" u="none" strike="noStrike" dirty="0">
-                          <a:solidFill>
-                            <a:srgbClr val="000000"/>
-                          </a:solidFill>
-                          <a:effectLst/>
-                          <a:latin typeface="Tw Cen MT" panose="020B0602020104020603" pitchFamily="34" charset="77"/>
-                        </a:rPr>
-                        <a:t>32</a:t>
-                      </a:r>
-                    </a:p>
-                  </a:txBody>
-                  <a:tcPr marL="5357" marR="5357" marT="5357" marB="0" anchor="ctr">
-                    <a:noFill/>
-                  </a:tcPr>
-                </a:tc>
-                <a:extLst>
-                  <a:ext uri="{0D108BD9-81ED-4DB2-BD59-A6C34878D82A}">
-                    <a16:rowId xmlns:a16="http://schemas.microsoft.com/office/drawing/2014/main" val="4139879712"/>
-                  </a:ext>
-                </a:extLst>
-              </a:tr>
-              <a:tr h="221815">
-                <a:tc>
-                  <a:txBody>
-                    <a:bodyPr/>
-                    <a:lstStyle/>
-                    <a:p>
-                      <a:pPr algn="ctr" fontAlgn="b"/>
-                      <a:r>
-                        <a:rPr lang="en-US" sz="1000" b="0" i="0" u="none" strike="noStrike" dirty="0">
-                          <a:solidFill>
-                            <a:srgbClr val="000000"/>
-                          </a:solidFill>
-                          <a:effectLst/>
-                          <a:latin typeface="Tw Cen MT" panose="020B0602020104020603" pitchFamily="34" charset="77"/>
-                        </a:rPr>
-                        <a:t>UCLA ADHD</a:t>
-                      </a:r>
-                    </a:p>
-                  </a:txBody>
-                  <a:tcPr marL="5357" marR="5357" marT="5357" marB="0" anchor="ctr"/>
-                </a:tc>
-                <a:tc>
-                  <a:txBody>
-                    <a:bodyPr/>
-                    <a:lstStyle/>
-                    <a:p>
-                      <a:pPr algn="ctr" fontAlgn="b"/>
-                      <a:r>
-                        <a:rPr lang="en-US" sz="1000" b="0" i="0" u="none" strike="noStrike" dirty="0">
-                          <a:solidFill>
-                            <a:srgbClr val="000000"/>
-                          </a:solidFill>
-                          <a:effectLst/>
-                          <a:latin typeface="Tw Cen MT" panose="020B0602020104020603" pitchFamily="34" charset="77"/>
-                        </a:rPr>
-                        <a:t>39</a:t>
-                      </a:r>
-                    </a:p>
-                  </a:txBody>
-                  <a:tcPr marL="5357" marR="5357" marT="5357" marB="0" anchor="ctr"/>
-                </a:tc>
-                <a:tc>
-                  <a:txBody>
-                    <a:bodyPr/>
-                    <a:lstStyle/>
-                    <a:p>
-                      <a:pPr algn="ctr" fontAlgn="b"/>
-                      <a:r>
-                        <a:rPr lang="en-US" sz="1000" b="0" i="0" u="none" strike="noStrike" dirty="0">
-                          <a:solidFill>
-                            <a:srgbClr val="000000"/>
-                          </a:solidFill>
-                          <a:effectLst/>
-                          <a:latin typeface="Tw Cen MT" panose="020B0602020104020603" pitchFamily="34" charset="77"/>
-                        </a:rPr>
-                        <a:t>39</a:t>
-                      </a:r>
-                    </a:p>
-                  </a:txBody>
-                  <a:tcPr marL="5357" marR="5357" marT="5357" marB="0" anchor="ctr">
-                    <a:noFill/>
-                  </a:tcPr>
-                </a:tc>
-                <a:tc>
-                  <a:txBody>
-                    <a:bodyPr/>
-                    <a:lstStyle/>
-                    <a:p>
-                      <a:pPr algn="ctr" fontAlgn="b"/>
-                      <a:r>
-                        <a:rPr lang="en-US" sz="1000" b="0" i="0" u="none" strike="noStrike">
-                          <a:solidFill>
-                            <a:srgbClr val="000000"/>
-                          </a:solidFill>
-                          <a:effectLst/>
-                          <a:latin typeface="Tw Cen MT" panose="020B0602020104020603" pitchFamily="34" charset="77"/>
-                        </a:rPr>
-                        <a:t>35</a:t>
-                      </a:r>
-                      <a:endParaRPr lang="en-US" sz="1000" b="0" i="0" u="none" strike="noStrike" dirty="0">
-                        <a:solidFill>
-                          <a:srgbClr val="000000"/>
-                        </a:solidFill>
-                        <a:effectLst/>
-                        <a:latin typeface="Tw Cen MT" panose="020B0602020104020603" pitchFamily="34" charset="77"/>
-                      </a:endParaRPr>
-                    </a:p>
-                  </a:txBody>
-                  <a:tcPr marL="5357" marR="5357" marT="5357" marB="0" anchor="ctr">
-                    <a:noFill/>
-                  </a:tcPr>
-                </a:tc>
-                <a:extLst>
-                  <a:ext uri="{0D108BD9-81ED-4DB2-BD59-A6C34878D82A}">
-                    <a16:rowId xmlns:a16="http://schemas.microsoft.com/office/drawing/2014/main" val="2430978846"/>
-                  </a:ext>
-                </a:extLst>
-              </a:tr>
-              <a:tr h="221815">
-                <a:tc>
-                  <a:txBody>
-                    <a:bodyPr/>
-                    <a:lstStyle/>
-                    <a:p>
-                      <a:pPr algn="ctr" fontAlgn="b"/>
-                      <a:r>
-                        <a:rPr lang="en-US" sz="1000" u="none" strike="noStrike">
-                          <a:effectLst/>
-                          <a:latin typeface="Tw Cen MT" panose="020B0602020104020603" pitchFamily="34" charset="77"/>
-                        </a:rPr>
-                        <a:t>ABIDE Control</a:t>
-                      </a:r>
-                      <a:endParaRPr lang="en-US" sz="1000" b="0" i="0" u="none" strike="noStrike">
-                        <a:solidFill>
-                          <a:srgbClr val="000000"/>
-                        </a:solidFill>
-                        <a:effectLst/>
-                        <a:latin typeface="Tw Cen MT" panose="020B0602020104020603" pitchFamily="34" charset="77"/>
-                      </a:endParaRPr>
-                    </a:p>
-                  </a:txBody>
-                  <a:tcPr marL="5357" marR="5357" marT="5357" marB="0" anchor="ctr"/>
-                </a:tc>
-                <a:tc>
-                  <a:txBody>
-                    <a:bodyPr/>
-                    <a:lstStyle/>
-                    <a:p>
-                      <a:pPr algn="ctr" fontAlgn="b"/>
-                      <a:r>
-                        <a:rPr lang="en-US" sz="1000" u="none" strike="noStrike" dirty="0">
-                          <a:effectLst/>
-                          <a:latin typeface="Tw Cen MT" panose="020B0602020104020603" pitchFamily="34" charset="77"/>
-                        </a:rPr>
-                        <a:t>601</a:t>
-                      </a:r>
-                      <a:endParaRPr lang="en-US" sz="1000" b="0" i="0" u="none" strike="noStrike" dirty="0">
-                        <a:solidFill>
-                          <a:srgbClr val="000000"/>
-                        </a:solidFill>
-                        <a:effectLst/>
-                        <a:latin typeface="Tw Cen MT" panose="020B0602020104020603" pitchFamily="34" charset="77"/>
-                      </a:endParaRPr>
-                    </a:p>
-                  </a:txBody>
-                  <a:tcPr marL="5357" marR="5357" marT="5357" marB="0" anchor="ctr"/>
-                </a:tc>
-                <a:tc>
-                  <a:txBody>
-                    <a:bodyPr/>
-                    <a:lstStyle/>
-                    <a:p>
-                      <a:pPr algn="ctr" fontAlgn="b"/>
-                      <a:r>
-                        <a:rPr lang="en-US" sz="1000" u="none" strike="noStrike" dirty="0">
-                          <a:effectLst/>
-                          <a:latin typeface="Tw Cen MT" panose="020B0602020104020603" pitchFamily="34" charset="77"/>
-                        </a:rPr>
-                        <a:t>578</a:t>
-                      </a:r>
-                      <a:endParaRPr lang="en-US" sz="1000" b="0" i="0" u="none" strike="noStrike" dirty="0">
-                        <a:solidFill>
-                          <a:srgbClr val="000000"/>
-                        </a:solidFill>
-                        <a:effectLst/>
-                        <a:latin typeface="Tw Cen MT" panose="020B0602020104020603" pitchFamily="34" charset="77"/>
-                      </a:endParaRPr>
-                    </a:p>
-                  </a:txBody>
-                  <a:tcPr marL="5357" marR="5357" marT="5357" marB="0" anchor="ctr"/>
-                </a:tc>
-                <a:tc>
-                  <a:txBody>
-                    <a:bodyPr/>
-                    <a:lstStyle/>
-                    <a:p>
-                      <a:pPr algn="ctr" fontAlgn="b"/>
-                      <a:r>
-                        <a:rPr lang="en-US" sz="1000" u="none" strike="noStrike" dirty="0">
-                          <a:effectLst/>
-                          <a:latin typeface="Tw Cen MT" panose="020B0602020104020603" pitchFamily="34" charset="77"/>
-                        </a:rPr>
-                        <a:t>357</a:t>
-                      </a:r>
-                      <a:endParaRPr lang="en-US" sz="1000" b="0" i="0" u="none" strike="noStrike" dirty="0">
-                        <a:solidFill>
-                          <a:srgbClr val="000000"/>
-                        </a:solidFill>
-                        <a:effectLst/>
-                        <a:latin typeface="Tw Cen MT" panose="020B0602020104020603" pitchFamily="34" charset="77"/>
-                      </a:endParaRPr>
-                    </a:p>
-                  </a:txBody>
-                  <a:tcPr marL="5357" marR="5357" marT="5357" marB="0" anchor="ctr"/>
-                </a:tc>
-                <a:extLst>
-                  <a:ext uri="{0D108BD9-81ED-4DB2-BD59-A6C34878D82A}">
-                    <a16:rowId xmlns:a16="http://schemas.microsoft.com/office/drawing/2014/main" val="3466335870"/>
-                  </a:ext>
-                </a:extLst>
-              </a:tr>
-              <a:tr h="221815">
-                <a:tc>
-                  <a:txBody>
-                    <a:bodyPr/>
-                    <a:lstStyle/>
-                    <a:p>
-                      <a:pPr algn="ctr" fontAlgn="b"/>
-                      <a:r>
-                        <a:rPr lang="en-US" sz="1000" u="none" strike="noStrike">
-                          <a:effectLst/>
-                          <a:latin typeface="Tw Cen MT" panose="020B0602020104020603" pitchFamily="34" charset="77"/>
-                        </a:rPr>
-                        <a:t>ABIDE ASD</a:t>
-                      </a:r>
-                      <a:endParaRPr lang="en-US" sz="1000" b="0" i="0" u="none" strike="noStrike">
-                        <a:solidFill>
-                          <a:srgbClr val="000000"/>
-                        </a:solidFill>
-                        <a:effectLst/>
-                        <a:latin typeface="Tw Cen MT" panose="020B0602020104020603" pitchFamily="34" charset="77"/>
-                      </a:endParaRPr>
-                    </a:p>
-                  </a:txBody>
-                  <a:tcPr marL="5357" marR="5357" marT="5357" marB="0" anchor="ctr"/>
-                </a:tc>
-                <a:tc>
-                  <a:txBody>
-                    <a:bodyPr/>
-                    <a:lstStyle/>
-                    <a:p>
-                      <a:pPr algn="ctr" fontAlgn="b"/>
-                      <a:r>
-                        <a:rPr lang="en-US" sz="1000" u="none" strike="noStrike">
-                          <a:effectLst/>
-                          <a:latin typeface="Tw Cen MT" panose="020B0602020104020603" pitchFamily="34" charset="77"/>
-                        </a:rPr>
-                        <a:t>549</a:t>
-                      </a:r>
-                      <a:endParaRPr lang="en-US" sz="1000" b="0" i="0" u="none" strike="noStrike">
-                        <a:solidFill>
-                          <a:srgbClr val="000000"/>
-                        </a:solidFill>
-                        <a:effectLst/>
-                        <a:latin typeface="Tw Cen MT" panose="020B0602020104020603" pitchFamily="34" charset="77"/>
-                      </a:endParaRPr>
-                    </a:p>
-                  </a:txBody>
-                  <a:tcPr marL="5357" marR="5357" marT="5357" marB="0" anchor="ctr"/>
-                </a:tc>
-                <a:tc>
-                  <a:txBody>
-                    <a:bodyPr/>
-                    <a:lstStyle/>
-                    <a:p>
-                      <a:pPr algn="ctr" fontAlgn="b"/>
-                      <a:r>
-                        <a:rPr lang="en-US" sz="1000" u="none" strike="noStrike" dirty="0">
-                          <a:effectLst/>
-                          <a:latin typeface="Tw Cen MT" panose="020B0602020104020603" pitchFamily="34" charset="77"/>
-                        </a:rPr>
-                        <a:t>513</a:t>
-                      </a:r>
-                      <a:endParaRPr lang="en-US" sz="1000" b="0" i="0" u="none" strike="noStrike" dirty="0">
-                        <a:solidFill>
-                          <a:srgbClr val="000000"/>
-                        </a:solidFill>
-                        <a:effectLst/>
-                        <a:latin typeface="Tw Cen MT" panose="020B0602020104020603" pitchFamily="34" charset="77"/>
-                      </a:endParaRPr>
-                    </a:p>
-                  </a:txBody>
-                  <a:tcPr marL="5357" marR="5357" marT="5357" marB="0" anchor="ctr"/>
-                </a:tc>
-                <a:tc>
-                  <a:txBody>
-                    <a:bodyPr/>
-                    <a:lstStyle/>
-                    <a:p>
-                      <a:pPr algn="ctr" fontAlgn="b"/>
-                      <a:r>
-                        <a:rPr lang="en-US" sz="1000" u="none" strike="noStrike" dirty="0">
-                          <a:effectLst/>
-                          <a:latin typeface="Tw Cen MT" panose="020B0602020104020603" pitchFamily="34" charset="77"/>
-                        </a:rPr>
-                        <a:t>250</a:t>
-                      </a:r>
-                      <a:endParaRPr lang="en-US" sz="1000" b="0" i="0" u="none" strike="noStrike" dirty="0">
-                        <a:solidFill>
-                          <a:srgbClr val="000000"/>
-                        </a:solidFill>
-                        <a:effectLst/>
-                        <a:latin typeface="Tw Cen MT" panose="020B0602020104020603" pitchFamily="34" charset="77"/>
-                      </a:endParaRPr>
-                    </a:p>
-                  </a:txBody>
-                  <a:tcPr marL="5357" marR="5357" marT="5357" marB="0" anchor="ctr"/>
-                </a:tc>
-                <a:extLst>
-                  <a:ext uri="{0D108BD9-81ED-4DB2-BD59-A6C34878D82A}">
-                    <a16:rowId xmlns:a16="http://schemas.microsoft.com/office/drawing/2014/main" val="2461682816"/>
-                  </a:ext>
-                </a:extLst>
-              </a:tr>
-            </a:tbl>
-          </a:graphicData>
-        </a:graphic>
-      </p:graphicFrame>
-      <p:sp>
-        <p:nvSpPr>
-          <p:cNvPr id="3" name="TextBox 2">
-            <a:extLst>
-              <a:ext uri="{FF2B5EF4-FFF2-40B4-BE49-F238E27FC236}">
-                <a16:creationId xmlns:a16="http://schemas.microsoft.com/office/drawing/2014/main" id="{A5D3FF58-4ABB-4610-78D8-2D21E843DC90}"/>
-              </a:ext>
-            </a:extLst>
-          </p:cNvPr>
-          <p:cNvSpPr txBox="1"/>
-          <p:nvPr/>
-        </p:nvSpPr>
-        <p:spPr>
-          <a:xfrm>
-            <a:off x="4690486" y="546027"/>
-            <a:ext cx="4422084" cy="646331"/>
+            <a:off x="34532" y="13609"/>
+            <a:ext cx="553376" cy="372859"/>
           </a:xfrm>
           <a:prstGeom prst="rect">
             <a:avLst/>
@@ -4692,14 +3921,134 @@
           <a:lstStyle/>
           <a:p>
             <a:r>
-              <a:rPr lang="en-US" dirty="0">
+              <a:rPr lang="en-US" sz="1823" b="1" dirty="0">
                 <a:latin typeface="Tw Cen MT" panose="020B0602020104020603" pitchFamily="34" charset="77"/>
                 <a:ea typeface="Open Sans" pitchFamily="2" charset="0"/>
                 <a:cs typeface="Open Sans" pitchFamily="2" charset="0"/>
               </a:rPr>
-              <a:t>*Missing movement data for control sub-10269</a:t>
-            </a:r>
-            <a:endParaRPr lang="en-AU" dirty="0">
+              <a:t>A</a:t>
+            </a:r>
+            <a:endParaRPr lang="en-AU" sz="1823" b="1" dirty="0">
+              <a:latin typeface="Tw Cen MT" panose="020B0602020104020603" pitchFamily="34" charset="77"/>
+              <a:ea typeface="Open Sans" pitchFamily="2" charset="0"/>
+              <a:cs typeface="Open Sans" pitchFamily="2" charset="0"/>
+            </a:endParaRPr>
+          </a:p>
+        </p:txBody>
+      </p:sp>
+      <p:sp>
+        <p:nvSpPr>
+          <p:cNvPr id="7" name="TextBox 6">
+            <a:extLst>
+              <a:ext uri="{FF2B5EF4-FFF2-40B4-BE49-F238E27FC236}">
+                <a16:creationId xmlns:a16="http://schemas.microsoft.com/office/drawing/2014/main" id="{AFC9C859-E87F-F789-1526-53D9AB2758A9}"/>
+              </a:ext>
+            </a:extLst>
+          </p:cNvPr>
+          <p:cNvSpPr txBox="1"/>
+          <p:nvPr/>
+        </p:nvSpPr>
+        <p:spPr>
+          <a:xfrm>
+            <a:off x="4545497" y="13609"/>
+            <a:ext cx="553376" cy="372859"/>
+          </a:xfrm>
+          <a:prstGeom prst="rect">
+            <a:avLst/>
+          </a:prstGeom>
+          <a:noFill/>
+        </p:spPr>
+        <p:txBody>
+          <a:bodyPr wrap="square">
+            <a:spAutoFit/>
+          </a:bodyPr>
+          <a:lstStyle/>
+          <a:p>
+            <a:r>
+              <a:rPr lang="en-US" sz="1823" b="1" dirty="0">
+                <a:latin typeface="Tw Cen MT" panose="020B0602020104020603" pitchFamily="34" charset="77"/>
+                <a:ea typeface="Open Sans" pitchFamily="2" charset="0"/>
+                <a:cs typeface="Open Sans" pitchFamily="2" charset="0"/>
+              </a:rPr>
+              <a:t>B</a:t>
+            </a:r>
+            <a:endParaRPr lang="en-AU" sz="1823" b="1" dirty="0">
+              <a:latin typeface="Tw Cen MT" panose="020B0602020104020603" pitchFamily="34" charset="77"/>
+              <a:ea typeface="Open Sans" pitchFamily="2" charset="0"/>
+              <a:cs typeface="Open Sans" pitchFamily="2" charset="0"/>
+            </a:endParaRPr>
+          </a:p>
+        </p:txBody>
+      </p:sp>
+      <p:sp>
+        <p:nvSpPr>
+          <p:cNvPr id="8" name="TextBox 7">
+            <a:extLst>
+              <a:ext uri="{FF2B5EF4-FFF2-40B4-BE49-F238E27FC236}">
+                <a16:creationId xmlns:a16="http://schemas.microsoft.com/office/drawing/2014/main" id="{0EBFD0B0-56F3-1375-2028-2CCB1527ED2C}"/>
+              </a:ext>
+            </a:extLst>
+          </p:cNvPr>
+          <p:cNvSpPr txBox="1"/>
+          <p:nvPr/>
+        </p:nvSpPr>
+        <p:spPr>
+          <a:xfrm>
+            <a:off x="5098873" y="485781"/>
+            <a:ext cx="1817977" cy="1619739"/>
+          </a:xfrm>
+          <a:prstGeom prst="rect">
+            <a:avLst/>
+          </a:prstGeom>
+          <a:noFill/>
+        </p:spPr>
+        <p:txBody>
+          <a:bodyPr wrap="square">
+            <a:spAutoFit/>
+          </a:bodyPr>
+          <a:lstStyle/>
+          <a:p>
+            <a:r>
+              <a:rPr lang="en-US" sz="1418" dirty="0">
+                <a:latin typeface="Tw Cen MT" panose="020B0602020104020603" pitchFamily="34" charset="77"/>
+                <a:ea typeface="Open Sans" pitchFamily="2" charset="0"/>
+                <a:cs typeface="Open Sans" pitchFamily="2" charset="0"/>
+              </a:rPr>
+              <a:t>Show </a:t>
+            </a:r>
+            <a:r>
+              <a:rPr lang="en-US" sz="1418" dirty="0" err="1">
+                <a:latin typeface="Tw Cen MT" panose="020B0602020104020603" pitchFamily="34" charset="77"/>
+                <a:ea typeface="Open Sans" pitchFamily="2" charset="0"/>
+                <a:cs typeface="Open Sans" pitchFamily="2" charset="0"/>
+              </a:rPr>
+              <a:t>balacc</a:t>
+            </a:r>
+            <a:r>
+              <a:rPr lang="en-US" sz="1418" dirty="0">
+                <a:latin typeface="Tw Cen MT" panose="020B0602020104020603" pitchFamily="34" charset="77"/>
+                <a:ea typeface="Open Sans" pitchFamily="2" charset="0"/>
+                <a:cs typeface="Open Sans" pitchFamily="2" charset="0"/>
+              </a:rPr>
+              <a:t> for </a:t>
+            </a:r>
+            <a:r>
+              <a:rPr lang="en-US" sz="1418" dirty="0" err="1">
+                <a:latin typeface="Tw Cen MT" panose="020B0602020104020603" pitchFamily="34" charset="77"/>
+                <a:ea typeface="Open Sans" pitchFamily="2" charset="0"/>
+                <a:cs typeface="Open Sans" pitchFamily="2" charset="0"/>
+              </a:rPr>
+              <a:t>mFD</a:t>
+            </a:r>
+            <a:r>
+              <a:rPr lang="en-US" sz="1418" dirty="0">
+                <a:latin typeface="Tw Cen MT" panose="020B0602020104020603" pitchFamily="34" charset="77"/>
+                <a:ea typeface="Open Sans" pitchFamily="2" charset="0"/>
+                <a:cs typeface="Open Sans" pitchFamily="2" charset="0"/>
+              </a:rPr>
+              <a:t> per dx group compared with combo-wise performance, top feature, and top brain region</a:t>
+            </a:r>
+            <a:endParaRPr lang="en-AU" sz="1418" dirty="0">
               <a:latin typeface="Tw Cen MT" panose="020B0602020104020603" pitchFamily="34" charset="77"/>
               <a:ea typeface="Open Sans" pitchFamily="2" charset="0"/>
               <a:cs typeface="Open Sans" pitchFamily="2" charset="0"/>

</xml_diff>

<commit_message>
new hyper hypo connectivity plots
</commit_message>
<xml_diff>
--- a/plots/Manuscript_Draft/movement_analysis/movement_analysis.pptx
+++ b/plots/Manuscript_Draft/movement_analysis/movement_analysis.pptx
@@ -197,7 +197,7 @@
           <a:p>
             <a:fld id="{ED21D31D-FBF1-5E4C-B56C-63D67C4A5E17}" type="datetimeFigureOut">
               <a:rPr lang="en-AU" smtClean="0"/>
-              <a:t>6/4/2023</a:t>
+              <a:t>30/6/2023</a:t>
             </a:fld>
             <a:endParaRPr lang="en-AU"/>
           </a:p>
@@ -727,7 +727,7 @@
           <a:p>
             <a:fld id="{BE6A98F5-0AEF-0741-A85D-2D17A4BA191C}" type="datetimeFigureOut">
               <a:rPr lang="en-AU" smtClean="0"/>
-              <a:t>6/4/2023</a:t>
+              <a:t>30/6/2023</a:t>
             </a:fld>
             <a:endParaRPr lang="en-AU"/>
           </a:p>
@@ -927,7 +927,7 @@
           <a:p>
             <a:fld id="{BE6A98F5-0AEF-0741-A85D-2D17A4BA191C}" type="datetimeFigureOut">
               <a:rPr lang="en-AU" smtClean="0"/>
-              <a:t>6/4/2023</a:t>
+              <a:t>30/6/2023</a:t>
             </a:fld>
             <a:endParaRPr lang="en-AU"/>
           </a:p>
@@ -1137,7 +1137,7 @@
           <a:p>
             <a:fld id="{BE6A98F5-0AEF-0741-A85D-2D17A4BA191C}" type="datetimeFigureOut">
               <a:rPr lang="en-AU" smtClean="0"/>
-              <a:t>6/4/2023</a:t>
+              <a:t>30/6/2023</a:t>
             </a:fld>
             <a:endParaRPr lang="en-AU"/>
           </a:p>
@@ -1337,7 +1337,7 @@
           <a:p>
             <a:fld id="{BE6A98F5-0AEF-0741-A85D-2D17A4BA191C}" type="datetimeFigureOut">
               <a:rPr lang="en-AU" smtClean="0"/>
-              <a:t>6/4/2023</a:t>
+              <a:t>30/6/2023</a:t>
             </a:fld>
             <a:endParaRPr lang="en-AU"/>
           </a:p>
@@ -1613,7 +1613,7 @@
           <a:p>
             <a:fld id="{BE6A98F5-0AEF-0741-A85D-2D17A4BA191C}" type="datetimeFigureOut">
               <a:rPr lang="en-AU" smtClean="0"/>
-              <a:t>6/4/2023</a:t>
+              <a:t>30/6/2023</a:t>
             </a:fld>
             <a:endParaRPr lang="en-AU"/>
           </a:p>
@@ -1881,7 +1881,7 @@
           <a:p>
             <a:fld id="{BE6A98F5-0AEF-0741-A85D-2D17A4BA191C}" type="datetimeFigureOut">
               <a:rPr lang="en-AU" smtClean="0"/>
-              <a:t>6/4/2023</a:t>
+              <a:t>30/6/2023</a:t>
             </a:fld>
             <a:endParaRPr lang="en-AU"/>
           </a:p>
@@ -2296,7 +2296,7 @@
           <a:p>
             <a:fld id="{BE6A98F5-0AEF-0741-A85D-2D17A4BA191C}" type="datetimeFigureOut">
               <a:rPr lang="en-AU" smtClean="0"/>
-              <a:t>6/4/2023</a:t>
+              <a:t>30/6/2023</a:t>
             </a:fld>
             <a:endParaRPr lang="en-AU"/>
           </a:p>
@@ -2438,7 +2438,7 @@
           <a:p>
             <a:fld id="{BE6A98F5-0AEF-0741-A85D-2D17A4BA191C}" type="datetimeFigureOut">
               <a:rPr lang="en-AU" smtClean="0"/>
-              <a:t>6/4/2023</a:t>
+              <a:t>30/6/2023</a:t>
             </a:fld>
             <a:endParaRPr lang="en-AU"/>
           </a:p>
@@ -2551,7 +2551,7 @@
           <a:p>
             <a:fld id="{BE6A98F5-0AEF-0741-A85D-2D17A4BA191C}" type="datetimeFigureOut">
               <a:rPr lang="en-AU" smtClean="0"/>
-              <a:t>6/4/2023</a:t>
+              <a:t>30/6/2023</a:t>
             </a:fld>
             <a:endParaRPr lang="en-AU"/>
           </a:p>
@@ -2864,7 +2864,7 @@
           <a:p>
             <a:fld id="{BE6A98F5-0AEF-0741-A85D-2D17A4BA191C}" type="datetimeFigureOut">
               <a:rPr lang="en-AU" smtClean="0"/>
-              <a:t>6/4/2023</a:t>
+              <a:t>30/6/2023</a:t>
             </a:fld>
             <a:endParaRPr lang="en-AU"/>
           </a:p>
@@ -3153,7 +3153,7 @@
           <a:p>
             <a:fld id="{BE6A98F5-0AEF-0741-A85D-2D17A4BA191C}" type="datetimeFigureOut">
               <a:rPr lang="en-AU" smtClean="0"/>
-              <a:t>6/4/2023</a:t>
+              <a:t>30/6/2023</a:t>
             </a:fld>
             <a:endParaRPr lang="en-AU"/>
           </a:p>
@@ -3396,7 +3396,7 @@
           <a:p>
             <a:fld id="{BE6A98F5-0AEF-0741-A85D-2D17A4BA191C}" type="datetimeFigureOut">
               <a:rPr lang="en-AU" smtClean="0"/>
-              <a:t>6/4/2023</a:t>
+              <a:t>30/6/2023</a:t>
             </a:fld>
             <a:endParaRPr lang="en-AU"/>
           </a:p>
@@ -3813,143 +3813,6 @@
           <a:chExt cx="0" cy="0"/>
         </a:xfrm>
       </p:grpSpPr>
-      <p:grpSp>
-        <p:nvGrpSpPr>
-          <p:cNvPr id="14" name="Group 13">
-            <a:extLst>
-              <a:ext uri="{FF2B5EF4-FFF2-40B4-BE49-F238E27FC236}">
-                <a16:creationId xmlns:a16="http://schemas.microsoft.com/office/drawing/2014/main" id="{7FA515DD-DF30-6ABB-C4ED-0387ABA45867}"/>
-              </a:ext>
-            </a:extLst>
-          </p:cNvPr>
-          <p:cNvGrpSpPr/>
-          <p:nvPr/>
-        </p:nvGrpSpPr>
-        <p:grpSpPr>
-          <a:xfrm>
-            <a:off x="191575" y="2098418"/>
-            <a:ext cx="3796952" cy="3608235"/>
-            <a:chOff x="113201" y="2098418"/>
-            <a:chExt cx="3986725" cy="3788576"/>
-          </a:xfrm>
-        </p:grpSpPr>
-        <p:pic>
-          <p:nvPicPr>
-            <p:cNvPr id="13" name="Picture 12" descr="A picture containing table&#10;&#10;Description automatically generated">
-              <a:extLst>
-                <a:ext uri="{FF2B5EF4-FFF2-40B4-BE49-F238E27FC236}">
-                  <a16:creationId xmlns:a16="http://schemas.microsoft.com/office/drawing/2014/main" id="{DF10D36B-BCE7-933D-25C8-5D8445F32B58}"/>
-                </a:ext>
-              </a:extLst>
-            </p:cNvPr>
-            <p:cNvPicPr>
-              <a:picLocks noChangeAspect="1"/>
-            </p:cNvPicPr>
-            <p:nvPr/>
-          </p:nvPicPr>
-          <p:blipFill rotWithShape="1">
-            <a:blip r:embed="rId3"/>
-            <a:srcRect l="2128" r="52811"/>
-            <a:stretch/>
-          </p:blipFill>
-          <p:spPr>
-            <a:xfrm>
-              <a:off x="113201" y="2098418"/>
-              <a:ext cx="1705222" cy="3784214"/>
-            </a:xfrm>
-            <a:prstGeom prst="rect">
-              <a:avLst/>
-            </a:prstGeom>
-          </p:spPr>
-        </p:pic>
-        <p:pic>
-          <p:nvPicPr>
-            <p:cNvPr id="18" name="Picture 17" descr="Background pattern&#10;&#10;Description automatically generated">
-              <a:extLst>
-                <a:ext uri="{FF2B5EF4-FFF2-40B4-BE49-F238E27FC236}">
-                  <a16:creationId xmlns:a16="http://schemas.microsoft.com/office/drawing/2014/main" id="{98D04A4E-F261-D729-2D31-E5090AE913E0}"/>
-                </a:ext>
-              </a:extLst>
-            </p:cNvPr>
-            <p:cNvPicPr>
-              <a:picLocks noChangeAspect="1"/>
-            </p:cNvPicPr>
-            <p:nvPr/>
-          </p:nvPicPr>
-          <p:blipFill rotWithShape="1">
-            <a:blip r:embed="rId4"/>
-            <a:srcRect l="3364" r="90063"/>
-            <a:stretch/>
-          </p:blipFill>
-          <p:spPr>
-            <a:xfrm>
-              <a:off x="1830930" y="2146878"/>
-              <a:ext cx="236715" cy="3601059"/>
-            </a:xfrm>
-            <a:prstGeom prst="rect">
-              <a:avLst/>
-            </a:prstGeom>
-          </p:spPr>
-        </p:pic>
-        <p:pic>
-          <p:nvPicPr>
-            <p:cNvPr id="21" name="Picture 20" descr="Background pattern&#10;&#10;Description automatically generated">
-              <a:extLst>
-                <a:ext uri="{FF2B5EF4-FFF2-40B4-BE49-F238E27FC236}">
-                  <a16:creationId xmlns:a16="http://schemas.microsoft.com/office/drawing/2014/main" id="{869A6D77-7621-35C4-718B-1ABA325C6423}"/>
-                </a:ext>
-              </a:extLst>
-            </p:cNvPr>
-            <p:cNvPicPr>
-              <a:picLocks noChangeAspect="1"/>
-            </p:cNvPicPr>
-            <p:nvPr/>
-          </p:nvPicPr>
-          <p:blipFill rotWithShape="1">
-            <a:blip r:embed="rId4"/>
-            <a:srcRect l="29005" t="94464" r="29517" b="-1417"/>
-            <a:stretch/>
-          </p:blipFill>
-          <p:spPr>
-            <a:xfrm>
-              <a:off x="609815" y="5552951"/>
-              <a:ext cx="1511993" cy="253406"/>
-            </a:xfrm>
-            <a:prstGeom prst="rect">
-              <a:avLst/>
-            </a:prstGeom>
-          </p:spPr>
-        </p:pic>
-        <p:pic>
-          <p:nvPicPr>
-            <p:cNvPr id="11" name="Picture 10" descr="A picture containing table&#10;&#10;Description automatically generated">
-              <a:extLst>
-                <a:ext uri="{FF2B5EF4-FFF2-40B4-BE49-F238E27FC236}">
-                  <a16:creationId xmlns:a16="http://schemas.microsoft.com/office/drawing/2014/main" id="{3621EB45-FE5B-91E3-032B-4220E88079E5}"/>
-                </a:ext>
-              </a:extLst>
-            </p:cNvPr>
-            <p:cNvPicPr>
-              <a:picLocks noChangeAspect="1"/>
-            </p:cNvPicPr>
-            <p:nvPr/>
-          </p:nvPicPr>
-          <p:blipFill rotWithShape="1">
-            <a:blip r:embed="rId3"/>
-            <a:srcRect l="47189"/>
-            <a:stretch/>
-          </p:blipFill>
-          <p:spPr>
-            <a:xfrm>
-              <a:off x="2101455" y="2102780"/>
-              <a:ext cx="1998471" cy="3784214"/>
-            </a:xfrm>
-            <a:prstGeom prst="rect">
-              <a:avLst/>
-            </a:prstGeom>
-          </p:spPr>
-        </p:pic>
-      </p:grpSp>
       <p:pic>
         <p:nvPicPr>
           <p:cNvPr id="8" name="Picture 7">
@@ -3965,7 +3828,7 @@
           <p:nvPr/>
         </p:nvPicPr>
         <p:blipFill>
-          <a:blip r:embed="rId5"/>
+          <a:blip r:embed="rId3"/>
           <a:srcRect/>
           <a:stretch/>
         </p:blipFill>
@@ -3994,7 +3857,7 @@
           <p:nvPr/>
         </p:nvPicPr>
         <p:blipFill>
-          <a:blip r:embed="rId6"/>
+          <a:blip r:embed="rId4"/>
           <a:srcRect/>
           <a:stretch/>
         </p:blipFill>
@@ -4067,7 +3930,7 @@
           <p:nvPr/>
         </p:nvPicPr>
         <p:blipFill>
-          <a:blip r:embed="rId7"/>
+          <a:blip r:embed="rId5"/>
           <a:srcRect/>
           <a:stretch/>
         </p:blipFill>
@@ -4081,35 +3944,6 @@
           </a:prstGeom>
         </p:spPr>
       </p:pic>
-      <p:pic>
-        <p:nvPicPr>
-          <p:cNvPr id="19" name="Picture 18">
-            <a:extLst>
-              <a:ext uri="{FF2B5EF4-FFF2-40B4-BE49-F238E27FC236}">
-                <a16:creationId xmlns:a16="http://schemas.microsoft.com/office/drawing/2014/main" id="{4E6F16D7-BB20-A2D7-2AD9-45177C77CB55}"/>
-              </a:ext>
-            </a:extLst>
-          </p:cNvPr>
-          <p:cNvPicPr>
-            <a:picLocks noChangeAspect="1"/>
-          </p:cNvPicPr>
-          <p:nvPr/>
-        </p:nvPicPr>
-        <p:blipFill>
-          <a:blip r:embed="rId8"/>
-          <a:srcRect/>
-          <a:stretch/>
-        </p:blipFill>
-        <p:spPr>
-          <a:xfrm>
-            <a:off x="4222289" y="2085274"/>
-            <a:ext cx="2351394" cy="3605471"/>
-          </a:xfrm>
-          <a:prstGeom prst="rect">
-            <a:avLst/>
-          </a:prstGeom>
-        </p:spPr>
-      </p:pic>
       <p:sp>
         <p:nvSpPr>
           <p:cNvPr id="7" name="TextBox 6">
@@ -4125,7 +3959,7 @@
         <p:spPr>
           <a:xfrm>
             <a:off x="6862572" y="1906531"/>
-            <a:ext cx="681087" cy="458909"/>
+            <a:ext cx="681087" cy="372859"/>
           </a:xfrm>
           <a:prstGeom prst="rect">
             <a:avLst/>
@@ -4144,7 +3978,7 @@
                 <a:ea typeface="Open Sans" pitchFamily="2" charset="0"/>
                 <a:cs typeface="Open Sans" pitchFamily="2" charset="0"/>
               </a:rPr>
-              <a:t>D</a:t>
+              <a:t>E</a:t>
             </a:r>
             <a:endParaRPr lang="en-AU" sz="1823" b="1" dirty="0">
               <a:latin typeface="Tw Cen MT" panose="020B0602020104020603" pitchFamily="34" charset="77"/>
@@ -4154,50 +3988,100 @@
           </a:p>
         </p:txBody>
       </p:sp>
-      <p:sp>
-        <p:nvSpPr>
-          <p:cNvPr id="4" name="TextBox 3">
-            <a:extLst>
-              <a:ext uri="{FF2B5EF4-FFF2-40B4-BE49-F238E27FC236}">
-                <a16:creationId xmlns:a16="http://schemas.microsoft.com/office/drawing/2014/main" id="{425E9E41-F05D-1F37-E3D0-1C722D0A1FD3}"/>
-              </a:ext>
-            </a:extLst>
-          </p:cNvPr>
-          <p:cNvSpPr txBox="1"/>
+      <p:grpSp>
+        <p:nvGrpSpPr>
+          <p:cNvPr id="3" name="Group 2">
+            <a:extLst>
+              <a:ext uri="{FF2B5EF4-FFF2-40B4-BE49-F238E27FC236}">
+                <a16:creationId xmlns:a16="http://schemas.microsoft.com/office/drawing/2014/main" id="{411625EA-EBAB-AD01-1613-42E863FD7FAB}"/>
+              </a:ext>
+            </a:extLst>
+          </p:cNvPr>
+          <p:cNvGrpSpPr/>
           <p:nvPr/>
-        </p:nvSpPr>
-        <p:spPr>
+        </p:nvGrpSpPr>
+        <p:grpSpPr>
           <a:xfrm>
-            <a:off x="4200107" y="1906531"/>
-            <a:ext cx="681087" cy="458909"/>
+            <a:off x="90120" y="1910160"/>
+            <a:ext cx="2373576" cy="3784214"/>
+            <a:chOff x="4200107" y="1906531"/>
+            <a:chExt cx="2373576" cy="3784214"/>
           </a:xfrm>
-          <a:prstGeom prst="rect">
-            <a:avLst/>
-          </a:prstGeom>
-          <a:noFill/>
-        </p:spPr>
-        <p:txBody>
-          <a:bodyPr wrap="square">
-            <a:spAutoFit/>
-          </a:bodyPr>
-          <a:lstStyle/>
-          <a:p>
-            <a:r>
-              <a:rPr lang="en-US" sz="1823" b="1" dirty="0">
+        </p:grpSpPr>
+        <p:pic>
+          <p:nvPicPr>
+            <p:cNvPr id="19" name="Picture 18">
+              <a:extLst>
+                <a:ext uri="{FF2B5EF4-FFF2-40B4-BE49-F238E27FC236}">
+                  <a16:creationId xmlns:a16="http://schemas.microsoft.com/office/drawing/2014/main" id="{4E6F16D7-BB20-A2D7-2AD9-45177C77CB55}"/>
+                </a:ext>
+              </a:extLst>
+            </p:cNvPr>
+            <p:cNvPicPr>
+              <a:picLocks noChangeAspect="1"/>
+            </p:cNvPicPr>
+            <p:nvPr/>
+          </p:nvPicPr>
+          <p:blipFill>
+            <a:blip r:embed="rId6"/>
+            <a:srcRect/>
+            <a:stretch/>
+          </p:blipFill>
+          <p:spPr>
+            <a:xfrm>
+              <a:off x="4222289" y="2085274"/>
+              <a:ext cx="2351394" cy="3605471"/>
+            </a:xfrm>
+            <a:prstGeom prst="rect">
+              <a:avLst/>
+            </a:prstGeom>
+          </p:spPr>
+        </p:pic>
+        <p:sp>
+          <p:nvSpPr>
+            <p:cNvPr id="4" name="TextBox 3">
+              <a:extLst>
+                <a:ext uri="{FF2B5EF4-FFF2-40B4-BE49-F238E27FC236}">
+                  <a16:creationId xmlns:a16="http://schemas.microsoft.com/office/drawing/2014/main" id="{425E9E41-F05D-1F37-E3D0-1C722D0A1FD3}"/>
+                </a:ext>
+              </a:extLst>
+            </p:cNvPr>
+            <p:cNvSpPr txBox="1"/>
+            <p:nvPr/>
+          </p:nvSpPr>
+          <p:spPr>
+            <a:xfrm>
+              <a:off x="4200107" y="1906531"/>
+              <a:ext cx="681087" cy="372859"/>
+            </a:xfrm>
+            <a:prstGeom prst="rect">
+              <a:avLst/>
+            </a:prstGeom>
+            <a:noFill/>
+          </p:spPr>
+          <p:txBody>
+            <a:bodyPr wrap="square">
+              <a:spAutoFit/>
+            </a:bodyPr>
+            <a:lstStyle/>
+            <a:p>
+              <a:r>
+                <a:rPr lang="en-US" sz="1823" b="1" dirty="0">
+                  <a:latin typeface="Tw Cen MT" panose="020B0602020104020603" pitchFamily="34" charset="77"/>
+                  <a:ea typeface="Open Sans" pitchFamily="2" charset="0"/>
+                  <a:cs typeface="Open Sans" pitchFamily="2" charset="0"/>
+                </a:rPr>
+                <a:t>C</a:t>
+              </a:r>
+              <a:endParaRPr lang="en-AU" sz="1823" b="1" dirty="0">
                 <a:latin typeface="Tw Cen MT" panose="020B0602020104020603" pitchFamily="34" charset="77"/>
                 <a:ea typeface="Open Sans" pitchFamily="2" charset="0"/>
                 <a:cs typeface="Open Sans" pitchFamily="2" charset="0"/>
-              </a:rPr>
-              <a:t>C</a:t>
-            </a:r>
-            <a:endParaRPr lang="en-AU" sz="1823" b="1" dirty="0">
-              <a:latin typeface="Tw Cen MT" panose="020B0602020104020603" pitchFamily="34" charset="77"/>
-              <a:ea typeface="Open Sans" pitchFamily="2" charset="0"/>
-              <a:cs typeface="Open Sans" pitchFamily="2" charset="0"/>
-            </a:endParaRPr>
-          </a:p>
-        </p:txBody>
-      </p:sp>
+              </a:endParaRPr>
+            </a:p>
+          </p:txBody>
+        </p:sp>
+      </p:grpSp>
       <p:sp>
         <p:nvSpPr>
           <p:cNvPr id="9" name="TextBox 8">
@@ -4242,50 +4126,208 @@
           </a:p>
         </p:txBody>
       </p:sp>
-      <p:sp>
-        <p:nvSpPr>
-          <p:cNvPr id="2" name="TextBox 1">
-            <a:extLst>
-              <a:ext uri="{FF2B5EF4-FFF2-40B4-BE49-F238E27FC236}">
-                <a16:creationId xmlns:a16="http://schemas.microsoft.com/office/drawing/2014/main" id="{7EEC7BBB-0032-93B1-B4EC-C8BE9E6543F0}"/>
-              </a:ext>
-            </a:extLst>
-          </p:cNvPr>
-          <p:cNvSpPr txBox="1"/>
+      <p:grpSp>
+        <p:nvGrpSpPr>
+          <p:cNvPr id="5" name="Group 4">
+            <a:extLst>
+              <a:ext uri="{FF2B5EF4-FFF2-40B4-BE49-F238E27FC236}">
+                <a16:creationId xmlns:a16="http://schemas.microsoft.com/office/drawing/2014/main" id="{C4078963-CE74-D7DD-4465-29551D010912}"/>
+              </a:ext>
+            </a:extLst>
+          </p:cNvPr>
+          <p:cNvGrpSpPr/>
           <p:nvPr/>
-        </p:nvSpPr>
-        <p:spPr>
+        </p:nvGrpSpPr>
+        <p:grpSpPr>
           <a:xfrm>
-            <a:off x="60659" y="1906531"/>
-            <a:ext cx="553376" cy="372859"/>
+            <a:off x="2671406" y="1906531"/>
+            <a:ext cx="3927868" cy="3800122"/>
+            <a:chOff x="60659" y="1906531"/>
+            <a:chExt cx="3927868" cy="3800122"/>
           </a:xfrm>
-          <a:prstGeom prst="rect">
-            <a:avLst/>
-          </a:prstGeom>
-          <a:noFill/>
-        </p:spPr>
-        <p:txBody>
-          <a:bodyPr wrap="square">
-            <a:spAutoFit/>
-          </a:bodyPr>
-          <a:lstStyle/>
-          <a:p>
-            <a:r>
-              <a:rPr lang="en-US" sz="1823" b="1" dirty="0">
+        </p:grpSpPr>
+        <p:grpSp>
+          <p:nvGrpSpPr>
+            <p:cNvPr id="14" name="Group 13">
+              <a:extLst>
+                <a:ext uri="{FF2B5EF4-FFF2-40B4-BE49-F238E27FC236}">
+                  <a16:creationId xmlns:a16="http://schemas.microsoft.com/office/drawing/2014/main" id="{7FA515DD-DF30-6ABB-C4ED-0387ABA45867}"/>
+                </a:ext>
+              </a:extLst>
+            </p:cNvPr>
+            <p:cNvGrpSpPr/>
+            <p:nvPr/>
+          </p:nvGrpSpPr>
+          <p:grpSpPr>
+            <a:xfrm>
+              <a:off x="191575" y="2098418"/>
+              <a:ext cx="3796952" cy="3608235"/>
+              <a:chOff x="113201" y="2098418"/>
+              <a:chExt cx="3986725" cy="3788576"/>
+            </a:xfrm>
+          </p:grpSpPr>
+          <p:pic>
+            <p:nvPicPr>
+              <p:cNvPr id="13" name="Picture 12" descr="A picture containing table&#10;&#10;Description automatically generated">
+                <a:extLst>
+                  <a:ext uri="{FF2B5EF4-FFF2-40B4-BE49-F238E27FC236}">
+                    <a16:creationId xmlns:a16="http://schemas.microsoft.com/office/drawing/2014/main" id="{DF10D36B-BCE7-933D-25C8-5D8445F32B58}"/>
+                  </a:ext>
+                </a:extLst>
+              </p:cNvPr>
+              <p:cNvPicPr>
+                <a:picLocks noChangeAspect="1"/>
+              </p:cNvPicPr>
+              <p:nvPr/>
+            </p:nvPicPr>
+            <p:blipFill rotWithShape="1">
+              <a:blip r:embed="rId7"/>
+              <a:srcRect l="2128" r="52811"/>
+              <a:stretch/>
+            </p:blipFill>
+            <p:spPr>
+              <a:xfrm>
+                <a:off x="113201" y="2098418"/>
+                <a:ext cx="1705222" cy="3784214"/>
+              </a:xfrm>
+              <a:prstGeom prst="rect">
+                <a:avLst/>
+              </a:prstGeom>
+            </p:spPr>
+          </p:pic>
+          <p:pic>
+            <p:nvPicPr>
+              <p:cNvPr id="18" name="Picture 17" descr="Background pattern&#10;&#10;Description automatically generated">
+                <a:extLst>
+                  <a:ext uri="{FF2B5EF4-FFF2-40B4-BE49-F238E27FC236}">
+                    <a16:creationId xmlns:a16="http://schemas.microsoft.com/office/drawing/2014/main" id="{98D04A4E-F261-D729-2D31-E5090AE913E0}"/>
+                  </a:ext>
+                </a:extLst>
+              </p:cNvPr>
+              <p:cNvPicPr>
+                <a:picLocks noChangeAspect="1"/>
+              </p:cNvPicPr>
+              <p:nvPr/>
+            </p:nvPicPr>
+            <p:blipFill rotWithShape="1">
+              <a:blip r:embed="rId8"/>
+              <a:srcRect l="3364" r="90063"/>
+              <a:stretch/>
+            </p:blipFill>
+            <p:spPr>
+              <a:xfrm>
+                <a:off x="1830930" y="2146878"/>
+                <a:ext cx="236715" cy="3601059"/>
+              </a:xfrm>
+              <a:prstGeom prst="rect">
+                <a:avLst/>
+              </a:prstGeom>
+            </p:spPr>
+          </p:pic>
+          <p:pic>
+            <p:nvPicPr>
+              <p:cNvPr id="21" name="Picture 20" descr="Background pattern&#10;&#10;Description automatically generated">
+                <a:extLst>
+                  <a:ext uri="{FF2B5EF4-FFF2-40B4-BE49-F238E27FC236}">
+                    <a16:creationId xmlns:a16="http://schemas.microsoft.com/office/drawing/2014/main" id="{869A6D77-7621-35C4-718B-1ABA325C6423}"/>
+                  </a:ext>
+                </a:extLst>
+              </p:cNvPr>
+              <p:cNvPicPr>
+                <a:picLocks noChangeAspect="1"/>
+              </p:cNvPicPr>
+              <p:nvPr/>
+            </p:nvPicPr>
+            <p:blipFill rotWithShape="1">
+              <a:blip r:embed="rId8"/>
+              <a:srcRect l="29005" t="94464" r="29517" b="-1417"/>
+              <a:stretch/>
+            </p:blipFill>
+            <p:spPr>
+              <a:xfrm>
+                <a:off x="609815" y="5552951"/>
+                <a:ext cx="1511993" cy="253406"/>
+              </a:xfrm>
+              <a:prstGeom prst="rect">
+                <a:avLst/>
+              </a:prstGeom>
+            </p:spPr>
+          </p:pic>
+          <p:pic>
+            <p:nvPicPr>
+              <p:cNvPr id="11" name="Picture 10" descr="A picture containing table&#10;&#10;Description automatically generated">
+                <a:extLst>
+                  <a:ext uri="{FF2B5EF4-FFF2-40B4-BE49-F238E27FC236}">
+                    <a16:creationId xmlns:a16="http://schemas.microsoft.com/office/drawing/2014/main" id="{3621EB45-FE5B-91E3-032B-4220E88079E5}"/>
+                  </a:ext>
+                </a:extLst>
+              </p:cNvPr>
+              <p:cNvPicPr>
+                <a:picLocks noChangeAspect="1"/>
+              </p:cNvPicPr>
+              <p:nvPr/>
+            </p:nvPicPr>
+            <p:blipFill rotWithShape="1">
+              <a:blip r:embed="rId7"/>
+              <a:srcRect l="47189"/>
+              <a:stretch/>
+            </p:blipFill>
+            <p:spPr>
+              <a:xfrm>
+                <a:off x="2101455" y="2102780"/>
+                <a:ext cx="1998471" cy="3784214"/>
+              </a:xfrm>
+              <a:prstGeom prst="rect">
+                <a:avLst/>
+              </a:prstGeom>
+            </p:spPr>
+          </p:pic>
+        </p:grpSp>
+        <p:sp>
+          <p:nvSpPr>
+            <p:cNvPr id="2" name="TextBox 1">
+              <a:extLst>
+                <a:ext uri="{FF2B5EF4-FFF2-40B4-BE49-F238E27FC236}">
+                  <a16:creationId xmlns:a16="http://schemas.microsoft.com/office/drawing/2014/main" id="{7EEC7BBB-0032-93B1-B4EC-C8BE9E6543F0}"/>
+                </a:ext>
+              </a:extLst>
+            </p:cNvPr>
+            <p:cNvSpPr txBox="1"/>
+            <p:nvPr/>
+          </p:nvSpPr>
+          <p:spPr>
+            <a:xfrm>
+              <a:off x="60659" y="1906531"/>
+              <a:ext cx="553376" cy="372859"/>
+            </a:xfrm>
+            <a:prstGeom prst="rect">
+              <a:avLst/>
+            </a:prstGeom>
+            <a:noFill/>
+          </p:spPr>
+          <p:txBody>
+            <a:bodyPr wrap="square">
+              <a:spAutoFit/>
+            </a:bodyPr>
+            <a:lstStyle/>
+            <a:p>
+              <a:r>
+                <a:rPr lang="en-US" sz="1823" b="1" dirty="0">
+                  <a:latin typeface="Tw Cen MT" panose="020B0602020104020603" pitchFamily="34" charset="77"/>
+                  <a:ea typeface="Open Sans" pitchFamily="2" charset="0"/>
+                  <a:cs typeface="Open Sans" pitchFamily="2" charset="0"/>
+                </a:rPr>
+                <a:t>D</a:t>
+              </a:r>
+              <a:endParaRPr lang="en-AU" sz="1823" b="1" dirty="0">
                 <a:latin typeface="Tw Cen MT" panose="020B0602020104020603" pitchFamily="34" charset="77"/>
                 <a:ea typeface="Open Sans" pitchFamily="2" charset="0"/>
                 <a:cs typeface="Open Sans" pitchFamily="2" charset="0"/>
-              </a:rPr>
-              <a:t>B</a:t>
-            </a:r>
-            <a:endParaRPr lang="en-AU" sz="1823" b="1" dirty="0">
-              <a:latin typeface="Tw Cen MT" panose="020B0602020104020603" pitchFamily="34" charset="77"/>
-              <a:ea typeface="Open Sans" pitchFamily="2" charset="0"/>
-              <a:cs typeface="Open Sans" pitchFamily="2" charset="0"/>
-            </a:endParaRPr>
-          </a:p>
-        </p:txBody>
-      </p:sp>
+              </a:endParaRPr>
+            </a:p>
+          </p:txBody>
+        </p:sp>
+      </p:grpSp>
     </p:spTree>
     <p:extLst>
       <p:ext uri="{BB962C8B-B14F-4D97-AF65-F5344CB8AC3E}">

</xml_diff>